<commit_message>
SFINAE slides project and some cleanup with adding/deleting code samples
git-svn-id: https://svn.code.sf.net/p/cpp-lects-rus/code/trunk@232 39143b06-f351-456c-9f92-4cd32fad6823
</commit_message>
<xml_diff>
--- a/slides/sep2017/05-smartptrs.pptx
+++ b/slides/sep2017/05-smartptrs.pptx
@@ -1,6 +1,6 @@
 
 <file path=ppt/presentation.xml><?xml version="1.0" encoding="utf-8"?>
-<p:presentation xmlns:a="http://schemas.openxmlformats.org/drawingml/2006/main" xmlns:r="http://schemas.openxmlformats.org/officeDocument/2006/relationships" xmlns:p="http://schemas.openxmlformats.org/presentationml/2006/main" autoCompressPictures="0">
+<p:presentation xmlns:a="http://schemas.openxmlformats.org/drawingml/2006/main" xmlns:r="http://schemas.openxmlformats.org/officeDocument/2006/relationships" xmlns:p="http://schemas.openxmlformats.org/presentationml/2006/main" showSpecialPlsOnTitleSld="0" autoCompressPictures="0">
   <p:sldMasterIdLst>
     <p:sldMasterId id="2147483684" r:id="rId1"/>
   </p:sldMasterIdLst>
@@ -271,7 +271,7 @@
           <a:p>
             <a:fld id="{21D50A72-3986-41CB-A137-28D80D9AC371}" type="datetimeFigureOut">
               <a:rPr lang="en-US" smtClean="0"/>
-              <a:t>10/24/2017</a:t>
+              <a:t>10/27/2017</a:t>
             </a:fld>
             <a:endParaRPr lang="en-US"/>
           </a:p>
@@ -604,6 +604,90 @@
           <a:p>
             <a:fld id="{B6EF97DC-3C71-40A2-B73C-10154085259A}" type="slidenum">
               <a:rPr lang="en-US" smtClean="0"/>
+              <a:t>1</a:t>
+            </a:fld>
+            <a:endParaRPr lang="en-US"/>
+          </a:p>
+        </p:txBody>
+      </p:sp>
+    </p:spTree>
+    <p:extLst>
+      <p:ext uri="{BB962C8B-B14F-4D97-AF65-F5344CB8AC3E}">
+        <p14:creationId xmlns:p14="http://schemas.microsoft.com/office/powerpoint/2010/main" val="578354619"/>
+      </p:ext>
+    </p:extLst>
+  </p:cSld>
+  <p:clrMapOvr>
+    <a:masterClrMapping/>
+  </p:clrMapOvr>
+</p:notes>
+</file>
+
+<file path=ppt/notesSlides/notesSlide2.xml><?xml version="1.0" encoding="utf-8"?>
+<p:notes xmlns:a="http://schemas.openxmlformats.org/drawingml/2006/main" xmlns:r="http://schemas.openxmlformats.org/officeDocument/2006/relationships" xmlns:p="http://schemas.openxmlformats.org/presentationml/2006/main">
+  <p:cSld>
+    <p:spTree>
+      <p:nvGrpSpPr>
+        <p:cNvPr id="1" name=""/>
+        <p:cNvGrpSpPr/>
+        <p:nvPr/>
+      </p:nvGrpSpPr>
+      <p:grpSpPr>
+        <a:xfrm>
+          <a:off x="0" y="0"/>
+          <a:ext cx="0" cy="0"/>
+          <a:chOff x="0" y="0"/>
+          <a:chExt cx="0" cy="0"/>
+        </a:xfrm>
+      </p:grpSpPr>
+      <p:sp>
+        <p:nvSpPr>
+          <p:cNvPr id="2" name="Slide Image Placeholder 1"/>
+          <p:cNvSpPr>
+            <a:spLocks noGrp="1" noRot="1" noChangeAspect="1"/>
+          </p:cNvSpPr>
+          <p:nvPr>
+            <p:ph type="sldImg"/>
+          </p:nvPr>
+        </p:nvSpPr>
+        <p:spPr/>
+      </p:sp>
+      <p:sp>
+        <p:nvSpPr>
+          <p:cNvPr id="3" name="Notes Placeholder 2"/>
+          <p:cNvSpPr>
+            <a:spLocks noGrp="1"/>
+          </p:cNvSpPr>
+          <p:nvPr>
+            <p:ph type="body" idx="1"/>
+          </p:nvPr>
+        </p:nvSpPr>
+        <p:spPr/>
+        <p:txBody>
+          <a:bodyPr/>
+          <a:lstStyle/>
+          <a:p>
+            <a:endParaRPr lang="en-US"/>
+          </a:p>
+        </p:txBody>
+      </p:sp>
+      <p:sp>
+        <p:nvSpPr>
+          <p:cNvPr id="4" name="Slide Number Placeholder 3"/>
+          <p:cNvSpPr>
+            <a:spLocks noGrp="1"/>
+          </p:cNvSpPr>
+          <p:nvPr>
+            <p:ph type="sldNum" sz="quarter" idx="10"/>
+          </p:nvPr>
+        </p:nvSpPr>
+        <p:spPr/>
+        <p:txBody>
+          <a:bodyPr/>
+          <a:lstStyle/>
+          <a:p>
+            <a:fld id="{B6EF97DC-3C71-40A2-B73C-10154085259A}" type="slidenum">
+              <a:rPr lang="en-US" smtClean="0"/>
               <a:t>25</a:t>
             </a:fld>
             <a:endParaRPr lang="en-US"/>
@@ -623,7 +707,7 @@
 </p:notes>
 </file>
 
-<file path=ppt/notesSlides/notesSlide2.xml><?xml version="1.0" encoding="utf-8"?>
+<file path=ppt/notesSlides/notesSlide3.xml><?xml version="1.0" encoding="utf-8"?>
 <p:notes xmlns:a="http://schemas.openxmlformats.org/drawingml/2006/main" xmlns:r="http://schemas.openxmlformats.org/officeDocument/2006/relationships" xmlns:p="http://schemas.openxmlformats.org/presentationml/2006/main">
   <p:cSld>
     <p:spTree>
@@ -903,7 +987,7 @@
           <a:p>
             <a:fld id="{49BDB67B-6C72-4CCB-8A1F-2E412310B470}" type="datetime1">
               <a:rPr lang="en-US" smtClean="0"/>
-              <a:t>10/24/2017</a:t>
+              <a:t>10/27/2017</a:t>
             </a:fld>
             <a:endParaRPr lang="en-US" dirty="0"/>
           </a:p>
@@ -1120,7 +1204,7 @@
           <a:p>
             <a:fld id="{857A66B1-B7CF-4260-A162-F8D02C31531B}" type="datetime1">
               <a:rPr lang="en-US" smtClean="0"/>
-              <a:t>10/24/2017</a:t>
+              <a:t>10/27/2017</a:t>
             </a:fld>
             <a:endParaRPr lang="en-US" dirty="0"/>
           </a:p>
@@ -1295,7 +1379,7 @@
           <a:p>
             <a:fld id="{6616E464-19A7-4248-BA9A-E861D3DD9D26}" type="datetime1">
               <a:rPr lang="en-US" smtClean="0"/>
-              <a:t>10/24/2017</a:t>
+              <a:t>10/27/2017</a:t>
             </a:fld>
             <a:endParaRPr lang="en-US" dirty="0"/>
           </a:p>
@@ -1460,7 +1544,7 @@
           <a:p>
             <a:fld id="{BC2C4D29-ADB5-4F1E-A930-55D627129F45}" type="datetime1">
               <a:rPr lang="en-US" smtClean="0"/>
-              <a:t>10/24/2017</a:t>
+              <a:t>10/27/2017</a:t>
             </a:fld>
             <a:endParaRPr lang="en-US" dirty="0"/>
           </a:p>
@@ -1706,7 +1790,7 @@
           <a:p>
             <a:fld id="{22F80F1B-91BE-4204-B307-6587AEFA64E3}" type="datetime1">
               <a:rPr lang="en-US" smtClean="0"/>
-              <a:t>10/24/2017</a:t>
+              <a:t>10/27/2017</a:t>
             </a:fld>
             <a:endParaRPr lang="en-US" dirty="0"/>
           </a:p>
@@ -2024,7 +2108,7 @@
           <a:p>
             <a:fld id="{D6401DB3-240C-40A3-A821-E0AB27FEBAF0}" type="datetime1">
               <a:rPr lang="en-US" smtClean="0"/>
-              <a:t>10/24/2017</a:t>
+              <a:t>10/27/2017</a:t>
             </a:fld>
             <a:endParaRPr lang="en-US" dirty="0"/>
           </a:p>
@@ -2443,7 +2527,7 @@
           <a:p>
             <a:fld id="{5CB5C491-5107-45D8-8222-EB7398509803}" type="datetime1">
               <a:rPr lang="en-US" smtClean="0"/>
-              <a:t>10/24/2017</a:t>
+              <a:t>10/27/2017</a:t>
             </a:fld>
             <a:endParaRPr lang="en-US" dirty="0"/>
           </a:p>
@@ -2556,7 +2640,7 @@
           <a:p>
             <a:fld id="{5ACD3623-5BE2-46C0-BBAE-C9322A0ECA23}" type="datetime1">
               <a:rPr lang="en-US" smtClean="0"/>
-              <a:t>10/24/2017</a:t>
+              <a:t>10/27/2017</a:t>
             </a:fld>
             <a:endParaRPr lang="en-US" dirty="0"/>
           </a:p>
@@ -2646,7 +2730,7 @@
           <a:p>
             <a:fld id="{4EC3E076-AE6A-4536-A835-5660B94EA114}" type="datetime1">
               <a:rPr lang="en-US" smtClean="0"/>
-              <a:t>10/24/2017</a:t>
+              <a:t>10/27/2017</a:t>
             </a:fld>
             <a:endParaRPr lang="en-US" dirty="0"/>
           </a:p>
@@ -2931,7 +3015,7 @@
           <a:p>
             <a:fld id="{6820825E-8767-4C41-BF4D-8C312262B11E}" type="datetime1">
               <a:rPr lang="en-US" smtClean="0"/>
-              <a:t>10/24/2017</a:t>
+              <a:t>10/27/2017</a:t>
             </a:fld>
             <a:endParaRPr lang="en-US" dirty="0"/>
           </a:p>
@@ -3198,7 +3282,7 @@
           <a:p>
             <a:fld id="{9DF75F72-1D4D-4EF1-AEC2-46725E799B2E}" type="datetime1">
               <a:rPr lang="en-US" smtClean="0"/>
-              <a:t>10/24/2017</a:t>
+              <a:t>10/27/2017</a:t>
             </a:fld>
             <a:endParaRPr lang="en-US" dirty="0"/>
           </a:p>
@@ -3446,7 +3530,7 @@
           <a:p>
             <a:fld id="{A4FD4E2A-358D-46EE-9DC1-13F591DDF835}" type="datetime1">
               <a:rPr lang="en-US" smtClean="0"/>
-              <a:t>10/24/2017</a:t>
+              <a:t>10/27/2017</a:t>
             </a:fld>
             <a:endParaRPr lang="en-US" dirty="0"/>
           </a:p>
@@ -4224,30 +4308,6 @@
           </a:p>
         </p:txBody>
       </p:sp>
-      <p:sp>
-        <p:nvSpPr>
-          <p:cNvPr id="5" name="Slide Number Placeholder 4"/>
-          <p:cNvSpPr>
-            <a:spLocks noGrp="1"/>
-          </p:cNvSpPr>
-          <p:nvPr>
-            <p:ph type="sldNum" sz="quarter" idx="12"/>
-          </p:nvPr>
-        </p:nvSpPr>
-        <p:spPr/>
-        <p:txBody>
-          <a:bodyPr/>
-          <a:lstStyle/>
-          <a:p>
-            <a:fld id="{4FAB73BC-B049-4115-A692-8D63A059BFB8}" type="slidenum">
-              <a:rPr lang="en-US" smtClean="0"/>
-              <a:pPr/>
-              <a:t>1</a:t>
-            </a:fld>
-            <a:endParaRPr lang="en-US" dirty="0"/>
-          </a:p>
-        </p:txBody>
-      </p:sp>
     </p:spTree>
     <p:extLst>
       <p:ext uri="{BB962C8B-B14F-4D97-AF65-F5344CB8AC3E}">
@@ -19125,19 +19185,7 @@
               <a:rPr lang="en-US" smtClean="0">
                 <a:latin typeface="Consolas" panose="020B0609020204030204" pitchFamily="49" charset="0"/>
               </a:rPr>
-              <a:t>  </a:t>
-            </a:r>
-            <a:r>
-              <a:rPr lang="en-US" smtClean="0">
-                <a:latin typeface="Consolas" panose="020B0609020204030204" pitchFamily="49" charset="0"/>
-              </a:rPr>
-              <a:t>slave-&gt;parent </a:t>
-            </a:r>
-            <a:r>
-              <a:rPr lang="en-US" smtClean="0">
-                <a:latin typeface="Consolas" panose="020B0609020204030204" pitchFamily="49" charset="0"/>
-              </a:rPr>
-              <a:t>= master;</a:t>
+              <a:t>  slave-&gt;parent = master;</a:t>
             </a:r>
             <a:r>
               <a:rPr lang="ru-RU" smtClean="0">
@@ -19172,19 +19220,7 @@
               <a:rPr lang="en-US" smtClean="0">
                 <a:latin typeface="Consolas" panose="020B0609020204030204" pitchFamily="49" charset="0"/>
               </a:rPr>
-              <a:t>  </a:t>
-            </a:r>
-            <a:r>
-              <a:rPr lang="en-US" smtClean="0">
-                <a:latin typeface="Consolas" panose="020B0609020204030204" pitchFamily="49" charset="0"/>
-              </a:rPr>
-              <a:t>master-&gt;left </a:t>
-            </a:r>
-            <a:r>
-              <a:rPr lang="en-US" smtClean="0">
-                <a:latin typeface="Consolas" panose="020B0609020204030204" pitchFamily="49" charset="0"/>
-              </a:rPr>
-              <a:t>= slave;</a:t>
+              <a:t>  master-&gt;left = slave;</a:t>
             </a:r>
             <a:r>
               <a:rPr lang="ru-RU" smtClean="0">
@@ -19528,19 +19564,7 @@
               <a:rPr lang="en-US" smtClean="0">
                 <a:latin typeface="Consolas" panose="020B0609020204030204" pitchFamily="49" charset="0"/>
               </a:rPr>
-              <a:t>  </a:t>
-            </a:r>
-            <a:r>
-              <a:rPr lang="en-US" smtClean="0">
-                <a:latin typeface="Consolas" panose="020B0609020204030204" pitchFamily="49" charset="0"/>
-              </a:rPr>
-              <a:t>slave-&gt;parent </a:t>
-            </a:r>
-            <a:r>
-              <a:rPr lang="en-US" smtClean="0">
-                <a:latin typeface="Consolas" panose="020B0609020204030204" pitchFamily="49" charset="0"/>
-              </a:rPr>
-              <a:t>= master;</a:t>
+              <a:t>  slave-&gt;parent = master;</a:t>
             </a:r>
             <a:r>
               <a:rPr lang="ru-RU" smtClean="0">
@@ -19590,19 +19614,7 @@
               <a:rPr lang="en-US" smtClean="0">
                 <a:latin typeface="Consolas" panose="020B0609020204030204" pitchFamily="49" charset="0"/>
               </a:rPr>
-              <a:t>  </a:t>
-            </a:r>
-            <a:r>
-              <a:rPr lang="en-US" smtClean="0">
-                <a:latin typeface="Consolas" panose="020B0609020204030204" pitchFamily="49" charset="0"/>
-              </a:rPr>
-              <a:t>master-&gt;left </a:t>
-            </a:r>
-            <a:r>
-              <a:rPr lang="en-US" smtClean="0">
-                <a:latin typeface="Consolas" panose="020B0609020204030204" pitchFamily="49" charset="0"/>
-              </a:rPr>
-              <a:t>= slave;</a:t>
+              <a:t>  master-&gt;left = slave;</a:t>
             </a:r>
             <a:r>
               <a:rPr lang="ru-RU" smtClean="0">
@@ -20003,7 +20015,15 @@
           <a:p>
             <a:r>
               <a:rPr lang="ru-RU" smtClean="0"/>
-              <a:t>Зато он может закончится. Типичный случай, приводящий к подвисанию обычных указателей</a:t>
+              <a:t>Зато он может закончит</a:t>
+            </a:r>
+            <a:r>
+              <a:rPr lang="ru-RU"/>
+              <a:t>ь</a:t>
+            </a:r>
+            <a:r>
+              <a:rPr lang="ru-RU" smtClean="0"/>
+              <a:t>ся. Типичный случай, приводящий к подвисанию обычных указателей</a:t>
             </a:r>
           </a:p>
           <a:p>
@@ -25141,7 +25161,15 @@
             </a:r>
             <a:r>
               <a:rPr lang="en-US" smtClean="0"/>
-              <a:t>shared_ptr&lt;char[], deleter&lt;char[]&gt;&gt;</a:t>
+              <a:t>shared_ptr&lt;char[], </a:t>
+            </a:r>
+            <a:r>
+              <a:rPr lang="en-US"/>
+              <a:t>default_delete&lt;char</a:t>
+            </a:r>
+            <a:r>
+              <a:rPr lang="en-US" smtClean="0"/>
+              <a:t>[]&gt;&gt;</a:t>
             </a:r>
             <a:r>
               <a:rPr lang="ru-RU" smtClean="0"/>
@@ -25264,7 +25292,7 @@
             </a:r>
             <a:r>
               <a:rPr lang="en-US" smtClean="0"/>
-              <a:t>shared_ptr&lt;char[], deleter&lt;char[]&gt;&gt;</a:t>
+              <a:t>shared_ptr&lt;char[], default_delete&lt;char[]&gt;&gt;</a:t>
             </a:r>
             <a:r>
               <a:rPr lang="ru-RU" smtClean="0"/>
@@ -25539,11 +25567,7 @@
             </a:r>
             <a:r>
               <a:rPr lang="en-US" sz="1800"/>
-              <a:t>technology </a:t>
-            </a:r>
-            <a:r>
-              <a:rPr lang="en-US" sz="1800"/>
-              <a:t>– </a:t>
+              <a:t>technology – </a:t>
             </a:r>
             <a:r>
               <a:rPr lang="en-US" sz="1800" dirty="0"/>
@@ -25582,33 +25606,16 @@
           <a:p>
             <a:r>
               <a:rPr lang="en-US" sz="1800" smtClean="0"/>
-              <a:t>Herb Sutter, "</a:t>
-            </a:r>
-            <a:r>
-              <a:rPr lang="en-US" sz="1800" smtClean="0"/>
-              <a:t>Leak-Freedom </a:t>
+              <a:t>Herb Sutter, "Leak-Freedom </a:t>
             </a:r>
             <a:r>
               <a:rPr lang="en-US" sz="1800"/>
-              <a:t>in C++... </a:t>
-            </a:r>
-            <a:r>
-              <a:rPr lang="en-US" sz="1800"/>
-              <a:t>By </a:t>
-            </a:r>
-            <a:r>
-              <a:rPr lang="en-US" sz="1800"/>
-              <a:t>Default", CppCon 2016, https</a:t>
-            </a:r>
-            <a:r>
-              <a:rPr lang="en-US" sz="1800"/>
-              <a:t>://</a:t>
+              <a:t>in C++... By Default", CppCon 2016, https://</a:t>
             </a:r>
             <a:r>
               <a:rPr lang="en-US" sz="1800" smtClean="0"/>
               <a:t>www.youtube.com/watch?v=JfmTagWcqoE</a:t>
             </a:r>
-            <a:endParaRPr lang="en-US" sz="1800" smtClean="0"/>
           </a:p>
           <a:p>
             <a:pPr lvl="0"/>
@@ -26183,17 +26190,7 @@
                   </a:solidFill>
                 </a:ln>
               </a:rPr>
-              <a:t>intrusive_ptr&lt;Data</a:t>
-            </a:r>
-            <a:r>
-              <a:rPr lang="en-US" smtClean="0">
-                <a:ln>
-                  <a:solidFill>
-                    <a:schemeClr val="tx1"/>
-                  </a:solidFill>
-                </a:ln>
-              </a:rPr>
-              <a:t>&gt;</a:t>
+              <a:t>intrusive_ptr&lt;Data&gt;</a:t>
             </a:r>
             <a:endParaRPr lang="en-US">
               <a:ln>
@@ -26413,42 +26410,30 @@
               <a:rPr lang="en-US">
                 <a:latin typeface="Consolas" panose="020B0609020204030204" pitchFamily="49" charset="0"/>
               </a:rPr>
-              <a:t>intrusive_ptr_add_ref(T* </a:t>
+              <a:t>intrusive_ptr_add_ref(T* ptr</a:t>
+            </a:r>
+            <a:r>
+              <a:rPr lang="en-US" smtClean="0">
+                <a:latin typeface="Consolas" panose="020B0609020204030204" pitchFamily="49" charset="0"/>
+              </a:rPr>
+              <a:t>) {</a:t>
+            </a:r>
+            <a:br>
+              <a:rPr lang="en-US" smtClean="0">
+                <a:latin typeface="Consolas" panose="020B0609020204030204" pitchFamily="49" charset="0"/>
+              </a:rPr>
+            </a:br>
+            <a:r>
+              <a:rPr lang="en-US" smtClean="0">
+                <a:latin typeface="Consolas" panose="020B0609020204030204" pitchFamily="49" charset="0"/>
+              </a:rPr>
+              <a:t>  ptr-</a:t>
             </a:r>
             <a:r>
               <a:rPr lang="en-US">
                 <a:latin typeface="Consolas" panose="020B0609020204030204" pitchFamily="49" charset="0"/>
               </a:rPr>
-              <a:t>ptr</a:t>
-            </a:r>
-            <a:r>
-              <a:rPr lang="en-US" smtClean="0">
-                <a:latin typeface="Consolas" panose="020B0609020204030204" pitchFamily="49" charset="0"/>
-              </a:rPr>
-              <a:t>) {</a:t>
-            </a:r>
-            <a:br>
-              <a:rPr lang="en-US" smtClean="0">
-                <a:latin typeface="Consolas" panose="020B0609020204030204" pitchFamily="49" charset="0"/>
-              </a:rPr>
-            </a:br>
-            <a:r>
-              <a:rPr lang="en-US" smtClean="0">
-                <a:latin typeface="Consolas" panose="020B0609020204030204" pitchFamily="49" charset="0"/>
-              </a:rPr>
-              <a:t>  ptr-</a:t>
-            </a:r>
-            <a:r>
-              <a:rPr lang="en-US">
-                <a:latin typeface="Consolas" panose="020B0609020204030204" pitchFamily="49" charset="0"/>
-              </a:rPr>
-              <a:t>&gt;</a:t>
-            </a:r>
-            <a:r>
-              <a:rPr lang="en-US">
-                <a:latin typeface="Consolas" panose="020B0609020204030204" pitchFamily="49" charset="0"/>
-              </a:rPr>
-              <a:t>add_ref</a:t>
+              <a:t>&gt;add_ref</a:t>
             </a:r>
             <a:r>
               <a:rPr lang="en-US" smtClean="0">
@@ -26485,19 +26470,36 @@
               <a:rPr lang="en-US">
                 <a:latin typeface="Consolas" panose="020B0609020204030204" pitchFamily="49" charset="0"/>
               </a:rPr>
-              <a:t>intrusive_ptr_release(T</a:t>
+              <a:t>intrusive_ptr_release(T* </a:t>
+            </a:r>
+            <a:r>
+              <a:rPr lang="en-US" smtClean="0">
+                <a:latin typeface="Consolas" panose="020B0609020204030204" pitchFamily="49" charset="0"/>
+              </a:rPr>
+              <a:t>ptr) {</a:t>
+            </a:r>
+            <a:br>
+              <a:rPr lang="en-US" smtClean="0">
+                <a:latin typeface="Consolas" panose="020B0609020204030204" pitchFamily="49" charset="0"/>
+              </a:rPr>
+            </a:br>
+            <a:r>
+              <a:rPr lang="en-US" smtClean="0">
+                <a:latin typeface="Consolas" panose="020B0609020204030204" pitchFamily="49" charset="0"/>
+              </a:rPr>
+              <a:t>  if</a:t>
             </a:r>
             <a:r>
               <a:rPr lang="en-US">
                 <a:latin typeface="Consolas" panose="020B0609020204030204" pitchFamily="49" charset="0"/>
               </a:rPr>
-              <a:t>* </a:t>
-            </a:r>
-            <a:r>
-              <a:rPr lang="en-US" smtClean="0">
-                <a:latin typeface="Consolas" panose="020B0609020204030204" pitchFamily="49" charset="0"/>
-              </a:rPr>
-              <a:t>ptr) {</a:t>
+              <a:t>(!ptr-&gt;release</a:t>
+            </a:r>
+            <a:r>
+              <a:rPr lang="en-US" smtClean="0">
+                <a:latin typeface="Consolas" panose="020B0609020204030204" pitchFamily="49" charset="0"/>
+              </a:rPr>
+              <a:t>())</a:t>
             </a:r>
             <a:br>
               <a:rPr lang="en-US" smtClean="0">
@@ -26508,48 +26510,13 @@
               <a:rPr lang="en-US" smtClean="0">
                 <a:latin typeface="Consolas" panose="020B0609020204030204" pitchFamily="49" charset="0"/>
               </a:rPr>
-              <a:t>  if</a:t>
+              <a:t>    </a:t>
             </a:r>
             <a:r>
               <a:rPr lang="en-US">
                 <a:latin typeface="Consolas" panose="020B0609020204030204" pitchFamily="49" charset="0"/>
               </a:rPr>
-              <a:t>(!ptr-&gt;</a:t>
-            </a:r>
-            <a:r>
-              <a:rPr lang="en-US">
-                <a:latin typeface="Consolas" panose="020B0609020204030204" pitchFamily="49" charset="0"/>
-              </a:rPr>
-              <a:t>release</a:t>
-            </a:r>
-            <a:r>
-              <a:rPr lang="en-US" smtClean="0">
-                <a:latin typeface="Consolas" panose="020B0609020204030204" pitchFamily="49" charset="0"/>
-              </a:rPr>
-              <a:t>())</a:t>
-            </a:r>
-            <a:br>
-              <a:rPr lang="en-US" smtClean="0">
-                <a:latin typeface="Consolas" panose="020B0609020204030204" pitchFamily="49" charset="0"/>
-              </a:rPr>
-            </a:br>
-            <a:r>
-              <a:rPr lang="en-US" smtClean="0">
-                <a:latin typeface="Consolas" panose="020B0609020204030204" pitchFamily="49" charset="0"/>
-              </a:rPr>
-              <a:t>    </a:t>
-            </a:r>
-            <a:r>
-              <a:rPr lang="en-US">
-                <a:latin typeface="Consolas" panose="020B0609020204030204" pitchFamily="49" charset="0"/>
-              </a:rPr>
-              <a:t>delete </a:t>
-            </a:r>
-            <a:r>
-              <a:rPr lang="en-US">
-                <a:latin typeface="Consolas" panose="020B0609020204030204" pitchFamily="49" charset="0"/>
-              </a:rPr>
-              <a:t>ptr</a:t>
+              <a:t>delete ptr</a:t>
             </a:r>
             <a:r>
               <a:rPr lang="en-US" smtClean="0">
@@ -26677,7 +26644,15 @@
             </a:r>
             <a:r>
               <a:rPr lang="en-US" smtClean="0"/>
-              <a:t>intrusive_ptr_add_rintrusive_ptr_release </a:t>
+              <a:t>intrusive_ptr_add_ref </a:t>
+            </a:r>
+            <a:r>
+              <a:rPr lang="ru-RU" smtClean="0"/>
+              <a:t>и </a:t>
+            </a:r>
+            <a:r>
+              <a:rPr lang="en-US" smtClean="0"/>
+              <a:t>intrusive_ptr_release </a:t>
             </a:r>
             <a:r>
               <a:rPr lang="ru-RU" smtClean="0"/>
@@ -26819,13 +26794,7 @@
               <a:rPr lang="en-US">
                 <a:latin typeface="Consolas" panose="020B0609020204030204" pitchFamily="49" charset="0"/>
               </a:rPr>
-              <a:t>add_ref() { return ++ref_cnt</a:t>
-            </a:r>
-            <a:r>
-              <a:rPr lang="en-US">
-                <a:latin typeface="Consolas" panose="020B0609020204030204" pitchFamily="49" charset="0"/>
-              </a:rPr>
-              <a:t>_; </a:t>
+              <a:t>add_ref() { return ++ref_cnt_; </a:t>
             </a:r>
             <a:r>
               <a:rPr lang="en-US" smtClean="0">
@@ -26860,13 +26829,7 @@
               <a:rPr lang="en-US">
                 <a:latin typeface="Consolas" panose="020B0609020204030204" pitchFamily="49" charset="0"/>
               </a:rPr>
-              <a:t>release() { return --ref_cnt</a:t>
-            </a:r>
-            <a:r>
-              <a:rPr lang="en-US">
-                <a:latin typeface="Consolas" panose="020B0609020204030204" pitchFamily="49" charset="0"/>
-              </a:rPr>
-              <a:t>_; </a:t>
+              <a:t>release() { return --ref_cnt_; </a:t>
             </a:r>
             <a:r>
               <a:rPr lang="en-US" smtClean="0">

</xml_diff>